<commit_message>
statistics and analyze html added
</commit_message>
<xml_diff>
--- a/_MUSTER/Konzept_assets.pptx
+++ b/_MUSTER/Konzept_assets.pptx
@@ -8,6 +8,7 @@
     <p:sldId id="256" r:id="rId2"/>
     <p:sldId id="257" r:id="rId3"/>
     <p:sldId id="258" r:id="rId4"/>
+    <p:sldId id="259" r:id="rId5"/>
   </p:sldIdLst>
   <p:sldSz cx="12192000" cy="6858000"/>
   <p:notesSz cx="6858000" cy="9144000"/>
@@ -106,6 +107,11 @@
       </a:defRPr>
     </a:lvl9pPr>
   </p:defaultTextStyle>
+  <p:extLst>
+    <p:ext uri="{EFAFB233-063F-42B5-8137-9DF3F51BA10A}">
+      <p15:sldGuideLst xmlns:p15="http://schemas.microsoft.com/office/powerpoint/2012/main"/>
+    </p:ext>
+  </p:extLst>
 </p:presentation>
 </file>
 
@@ -258,7 +264,7 @@
           <a:p>
             <a:fld id="{815ED8A6-0F61-42B6-93FC-E82594AC3222}" type="datetimeFigureOut">
               <a:rPr lang="de-AT" smtClean="0"/>
-              <a:t>05.05.2021</a:t>
+              <a:t>26.05.2021</a:t>
             </a:fld>
             <a:endParaRPr lang="de-AT"/>
           </a:p>
@@ -458,7 +464,7 @@
           <a:p>
             <a:fld id="{815ED8A6-0F61-42B6-93FC-E82594AC3222}" type="datetimeFigureOut">
               <a:rPr lang="de-AT" smtClean="0"/>
-              <a:t>05.05.2021</a:t>
+              <a:t>26.05.2021</a:t>
             </a:fld>
             <a:endParaRPr lang="de-AT"/>
           </a:p>
@@ -668,7 +674,7 @@
           <a:p>
             <a:fld id="{815ED8A6-0F61-42B6-93FC-E82594AC3222}" type="datetimeFigureOut">
               <a:rPr lang="de-AT" smtClean="0"/>
-              <a:t>05.05.2021</a:t>
+              <a:t>26.05.2021</a:t>
             </a:fld>
             <a:endParaRPr lang="de-AT"/>
           </a:p>
@@ -868,7 +874,7 @@
           <a:p>
             <a:fld id="{815ED8A6-0F61-42B6-93FC-E82594AC3222}" type="datetimeFigureOut">
               <a:rPr lang="de-AT" smtClean="0"/>
-              <a:t>05.05.2021</a:t>
+              <a:t>26.05.2021</a:t>
             </a:fld>
             <a:endParaRPr lang="de-AT"/>
           </a:p>
@@ -1144,7 +1150,7 @@
           <a:p>
             <a:fld id="{815ED8A6-0F61-42B6-93FC-E82594AC3222}" type="datetimeFigureOut">
               <a:rPr lang="de-AT" smtClean="0"/>
-              <a:t>05.05.2021</a:t>
+              <a:t>26.05.2021</a:t>
             </a:fld>
             <a:endParaRPr lang="de-AT"/>
           </a:p>
@@ -1412,7 +1418,7 @@
           <a:p>
             <a:fld id="{815ED8A6-0F61-42B6-93FC-E82594AC3222}" type="datetimeFigureOut">
               <a:rPr lang="de-AT" smtClean="0"/>
-              <a:t>05.05.2021</a:t>
+              <a:t>26.05.2021</a:t>
             </a:fld>
             <a:endParaRPr lang="de-AT"/>
           </a:p>
@@ -1827,7 +1833,7 @@
           <a:p>
             <a:fld id="{815ED8A6-0F61-42B6-93FC-E82594AC3222}" type="datetimeFigureOut">
               <a:rPr lang="de-AT" smtClean="0"/>
-              <a:t>05.05.2021</a:t>
+              <a:t>26.05.2021</a:t>
             </a:fld>
             <a:endParaRPr lang="de-AT"/>
           </a:p>
@@ -1969,7 +1975,7 @@
           <a:p>
             <a:fld id="{815ED8A6-0F61-42B6-93FC-E82594AC3222}" type="datetimeFigureOut">
               <a:rPr lang="de-AT" smtClean="0"/>
-              <a:t>05.05.2021</a:t>
+              <a:t>26.05.2021</a:t>
             </a:fld>
             <a:endParaRPr lang="de-AT"/>
           </a:p>
@@ -2082,7 +2088,7 @@
           <a:p>
             <a:fld id="{815ED8A6-0F61-42B6-93FC-E82594AC3222}" type="datetimeFigureOut">
               <a:rPr lang="de-AT" smtClean="0"/>
-              <a:t>05.05.2021</a:t>
+              <a:t>26.05.2021</a:t>
             </a:fld>
             <a:endParaRPr lang="de-AT"/>
           </a:p>
@@ -2395,7 +2401,7 @@
           <a:p>
             <a:fld id="{815ED8A6-0F61-42B6-93FC-E82594AC3222}" type="datetimeFigureOut">
               <a:rPr lang="de-AT" smtClean="0"/>
-              <a:t>05.05.2021</a:t>
+              <a:t>26.05.2021</a:t>
             </a:fld>
             <a:endParaRPr lang="de-AT"/>
           </a:p>
@@ -2684,7 +2690,7 @@
           <a:p>
             <a:fld id="{815ED8A6-0F61-42B6-93FC-E82594AC3222}" type="datetimeFigureOut">
               <a:rPr lang="de-AT" smtClean="0"/>
-              <a:t>05.05.2021</a:t>
+              <a:t>26.05.2021</a:t>
             </a:fld>
             <a:endParaRPr lang="de-AT"/>
           </a:p>
@@ -2927,7 +2933,7 @@
           <a:p>
             <a:fld id="{815ED8A6-0F61-42B6-93FC-E82594AC3222}" type="datetimeFigureOut">
               <a:rPr lang="de-AT" smtClean="0"/>
-              <a:t>05.05.2021</a:t>
+              <a:t>26.05.2021</a:t>
             </a:fld>
             <a:endParaRPr lang="de-AT"/>
           </a:p>
@@ -3756,6 +3762,533 @@
 </p:sld>
 </file>
 
+<file path=ppt/slides/slide4.xml><?xml version="1.0" encoding="utf-8"?>
+<p:sld xmlns:a="http://schemas.openxmlformats.org/drawingml/2006/main" xmlns:r="http://schemas.openxmlformats.org/officeDocument/2006/relationships" xmlns:p="http://schemas.openxmlformats.org/presentationml/2006/main">
+  <p:cSld>
+    <p:spTree>
+      <p:nvGrpSpPr>
+        <p:cNvPr id="1" name=""/>
+        <p:cNvGrpSpPr/>
+        <p:nvPr/>
+      </p:nvGrpSpPr>
+      <p:grpSpPr>
+        <a:xfrm>
+          <a:off x="0" y="0"/>
+          <a:ext cx="0" cy="0"/>
+          <a:chOff x="0" y="0"/>
+          <a:chExt cx="0" cy="0"/>
+        </a:xfrm>
+      </p:grpSpPr>
+      <p:sp>
+        <p:nvSpPr>
+          <p:cNvPr id="12" name="Rechteck 11">
+            <a:extLst>
+              <a:ext uri="{FF2B5EF4-FFF2-40B4-BE49-F238E27FC236}">
+                <a16:creationId xmlns:a16="http://schemas.microsoft.com/office/drawing/2014/main" id="{33F01F03-B095-4D72-8363-99B34A99A508}"/>
+              </a:ext>
+            </a:extLst>
+          </p:cNvPr>
+          <p:cNvSpPr/>
+          <p:nvPr/>
+        </p:nvSpPr>
+        <p:spPr>
+          <a:xfrm>
+            <a:off x="9556854" y="2465922"/>
+            <a:ext cx="914400" cy="1490870"/>
+          </a:xfrm>
+          <a:prstGeom prst="rect">
+            <a:avLst/>
+          </a:prstGeom>
+        </p:spPr>
+        <p:style>
+          <a:lnRef idx="2">
+            <a:schemeClr val="accent1">
+              <a:shade val="50000"/>
+            </a:schemeClr>
+          </a:lnRef>
+          <a:fillRef idx="1">
+            <a:schemeClr val="accent1"/>
+          </a:fillRef>
+          <a:effectRef idx="0">
+            <a:schemeClr val="accent1"/>
+          </a:effectRef>
+          <a:fontRef idx="minor">
+            <a:schemeClr val="lt1"/>
+          </a:fontRef>
+        </p:style>
+        <p:txBody>
+          <a:bodyPr rtlCol="0" anchor="ctr"/>
+          <a:lstStyle/>
+          <a:p>
+            <a:pPr algn="ctr"/>
+            <a:endParaRPr lang="de-AT"/>
+          </a:p>
+        </p:txBody>
+      </p:sp>
+      <p:sp>
+        <p:nvSpPr>
+          <p:cNvPr id="8" name="Rechteck: abgerundete Ecken 7">
+            <a:extLst>
+              <a:ext uri="{FF2B5EF4-FFF2-40B4-BE49-F238E27FC236}">
+                <a16:creationId xmlns:a16="http://schemas.microsoft.com/office/drawing/2014/main" id="{C61973B5-41E4-495D-8669-60EBDD4EC23B}"/>
+              </a:ext>
+            </a:extLst>
+          </p:cNvPr>
+          <p:cNvSpPr/>
+          <p:nvPr/>
+        </p:nvSpPr>
+        <p:spPr>
+          <a:xfrm>
+            <a:off x="1354160" y="2156792"/>
+            <a:ext cx="1800000" cy="1800000"/>
+          </a:xfrm>
+          <a:prstGeom prst="roundRect">
+            <a:avLst/>
+          </a:prstGeom>
+        </p:spPr>
+        <p:style>
+          <a:lnRef idx="2">
+            <a:schemeClr val="accent3">
+              <a:shade val="50000"/>
+            </a:schemeClr>
+          </a:lnRef>
+          <a:fillRef idx="1">
+            <a:schemeClr val="accent3"/>
+          </a:fillRef>
+          <a:effectRef idx="0">
+            <a:schemeClr val="accent3"/>
+          </a:effectRef>
+          <a:fontRef idx="minor">
+            <a:schemeClr val="lt1"/>
+          </a:fontRef>
+        </p:style>
+        <p:txBody>
+          <a:bodyPr rtlCol="0" anchor="ctr"/>
+          <a:lstStyle/>
+          <a:p>
+            <a:pPr algn="ctr"/>
+            <a:endParaRPr lang="de-AT" dirty="0"/>
+          </a:p>
+        </p:txBody>
+      </p:sp>
+      <p:sp>
+        <p:nvSpPr>
+          <p:cNvPr id="2" name="Titel 1">
+            <a:extLst>
+              <a:ext uri="{FF2B5EF4-FFF2-40B4-BE49-F238E27FC236}">
+                <a16:creationId xmlns:a16="http://schemas.microsoft.com/office/drawing/2014/main" id="{B22F6AA8-CDFC-4F8E-89F0-48A71CF4A78A}"/>
+              </a:ext>
+            </a:extLst>
+          </p:cNvPr>
+          <p:cNvSpPr>
+            <a:spLocks noGrp="1"/>
+          </p:cNvSpPr>
+          <p:nvPr>
+            <p:ph type="title"/>
+          </p:nvPr>
+        </p:nvSpPr>
+        <p:spPr/>
+        <p:txBody>
+          <a:bodyPr/>
+          <a:lstStyle/>
+          <a:p>
+            <a:r>
+              <a:rPr lang="de-AT" dirty="0"/>
+              <a:t>Kacheln</a:t>
+            </a:r>
+          </a:p>
+        </p:txBody>
+      </p:sp>
+      <p:pic>
+        <p:nvPicPr>
+          <p:cNvPr id="5" name="Grafik 4" descr="Bücher im Regal mit einfarbiger Füllung">
+            <a:extLst>
+              <a:ext uri="{FF2B5EF4-FFF2-40B4-BE49-F238E27FC236}">
+                <a16:creationId xmlns:a16="http://schemas.microsoft.com/office/drawing/2014/main" id="{5E88A7A5-24CF-449F-9700-9612AED587A5}"/>
+              </a:ext>
+            </a:extLst>
+          </p:cNvPr>
+          <p:cNvPicPr>
+            <a:picLocks noChangeAspect="1"/>
+          </p:cNvPicPr>
+          <p:nvPr/>
+        </p:nvPicPr>
+        <p:blipFill>
+          <a:blip r:embed="rId2">
+            <a:extLst>
+              <a:ext uri="{28A0092B-C50C-407E-A947-70E740481C1C}">
+                <a14:useLocalDpi xmlns:a14="http://schemas.microsoft.com/office/drawing/2010/main" val="0"/>
+              </a:ext>
+              <a:ext uri="{96DAC541-7B7A-43D3-8B79-37D633B846F1}">
+                <asvg:svgBlip xmlns:asvg="http://schemas.microsoft.com/office/drawing/2016/SVG/main" r:embed="rId3"/>
+              </a:ext>
+            </a:extLst>
+          </a:blip>
+          <a:stretch>
+            <a:fillRect/>
+          </a:stretch>
+        </p:blipFill>
+        <p:spPr>
+          <a:xfrm>
+            <a:off x="1796960" y="2599592"/>
+            <a:ext cx="914400" cy="914400"/>
+          </a:xfrm>
+          <a:prstGeom prst="rect">
+            <a:avLst/>
+          </a:prstGeom>
+        </p:spPr>
+      </p:pic>
+      <p:pic>
+        <p:nvPicPr>
+          <p:cNvPr id="7" name="Grafik 6" descr="Bücher im Regal Silhouette">
+            <a:extLst>
+              <a:ext uri="{FF2B5EF4-FFF2-40B4-BE49-F238E27FC236}">
+                <a16:creationId xmlns:a16="http://schemas.microsoft.com/office/drawing/2014/main" id="{3E7E5A8F-14D7-488F-AB12-52F49A2F8CEA}"/>
+              </a:ext>
+            </a:extLst>
+          </p:cNvPr>
+          <p:cNvPicPr>
+            <a:picLocks noChangeAspect="1"/>
+          </p:cNvPicPr>
+          <p:nvPr/>
+        </p:nvPicPr>
+        <p:blipFill>
+          <a:blip r:embed="rId4">
+            <a:extLst>
+              <a:ext uri="{28A0092B-C50C-407E-A947-70E740481C1C}">
+                <a14:useLocalDpi xmlns:a14="http://schemas.microsoft.com/office/drawing/2010/main" val="0"/>
+              </a:ext>
+              <a:ext uri="{96DAC541-7B7A-43D3-8B79-37D633B846F1}">
+                <asvg:svgBlip xmlns:asvg="http://schemas.microsoft.com/office/drawing/2016/SVG/main" r:embed="rId5"/>
+              </a:ext>
+            </a:extLst>
+          </a:blip>
+          <a:stretch>
+            <a:fillRect/>
+          </a:stretch>
+        </p:blipFill>
+        <p:spPr>
+          <a:xfrm>
+            <a:off x="7597827" y="2057400"/>
+            <a:ext cx="914400" cy="914400"/>
+          </a:xfrm>
+          <a:prstGeom prst="rect">
+            <a:avLst/>
+          </a:prstGeom>
+        </p:spPr>
+      </p:pic>
+      <p:pic>
+        <p:nvPicPr>
+          <p:cNvPr id="11" name="Grafik 10" descr="Bücher im Regal Silhouette">
+            <a:extLst>
+              <a:ext uri="{FF2B5EF4-FFF2-40B4-BE49-F238E27FC236}">
+                <a16:creationId xmlns:a16="http://schemas.microsoft.com/office/drawing/2014/main" id="{AD27A603-5AEC-4A44-BFDE-FF1F5CDEC6BF}"/>
+              </a:ext>
+            </a:extLst>
+          </p:cNvPr>
+          <p:cNvPicPr>
+            <a:picLocks noChangeAspect="1"/>
+          </p:cNvPicPr>
+          <p:nvPr/>
+        </p:nvPicPr>
+        <p:blipFill>
+          <a:blip r:embed="rId4">
+            <a:extLst>
+              <a:ext uri="{28A0092B-C50C-407E-A947-70E740481C1C}">
+                <a14:useLocalDpi xmlns:a14="http://schemas.microsoft.com/office/drawing/2010/main" val="0"/>
+              </a:ext>
+              <a:ext uri="{96DAC541-7B7A-43D3-8B79-37D633B846F1}">
+                <asvg:svgBlip xmlns:asvg="http://schemas.microsoft.com/office/drawing/2016/SVG/main" r:embed="rId5"/>
+              </a:ext>
+            </a:extLst>
+          </a:blip>
+          <a:stretch>
+            <a:fillRect/>
+          </a:stretch>
+        </p:blipFill>
+        <p:spPr>
+          <a:xfrm>
+            <a:off x="7597827" y="3400200"/>
+            <a:ext cx="914400" cy="914400"/>
+          </a:xfrm>
+          <a:prstGeom prst="rect">
+            <a:avLst/>
+          </a:prstGeom>
+        </p:spPr>
+      </p:pic>
+      <p:pic>
+        <p:nvPicPr>
+          <p:cNvPr id="15" name="Grafik 14">
+            <a:extLst>
+              <a:ext uri="{FF2B5EF4-FFF2-40B4-BE49-F238E27FC236}">
+                <a16:creationId xmlns:a16="http://schemas.microsoft.com/office/drawing/2014/main" id="{202DFB3A-4234-4092-A838-124935495982}"/>
+              </a:ext>
+            </a:extLst>
+          </p:cNvPr>
+          <p:cNvPicPr>
+            <a:picLocks noChangeAspect="1"/>
+          </p:cNvPicPr>
+          <p:nvPr/>
+        </p:nvPicPr>
+        <p:blipFill>
+          <a:blip r:embed="rId6"/>
+          <a:stretch>
+            <a:fillRect/>
+          </a:stretch>
+        </p:blipFill>
+        <p:spPr>
+          <a:xfrm>
+            <a:off x="1354160" y="4243135"/>
+            <a:ext cx="1810669" cy="1810669"/>
+          </a:xfrm>
+          <a:prstGeom prst="rect">
+            <a:avLst/>
+          </a:prstGeom>
+        </p:spPr>
+      </p:pic>
+      <p:sp>
+        <p:nvSpPr>
+          <p:cNvPr id="18" name="Rechteck: abgerundete Ecken 17">
+            <a:extLst>
+              <a:ext uri="{FF2B5EF4-FFF2-40B4-BE49-F238E27FC236}">
+                <a16:creationId xmlns:a16="http://schemas.microsoft.com/office/drawing/2014/main" id="{A47DA48A-6BA5-4C27-BE58-EFCE8D8009BB}"/>
+              </a:ext>
+            </a:extLst>
+          </p:cNvPr>
+          <p:cNvSpPr/>
+          <p:nvPr/>
+        </p:nvSpPr>
+        <p:spPr>
+          <a:xfrm>
+            <a:off x="3596960" y="2156792"/>
+            <a:ext cx="1800000" cy="1800000"/>
+          </a:xfrm>
+          <a:prstGeom prst="roundRect">
+            <a:avLst/>
+          </a:prstGeom>
+        </p:spPr>
+        <p:style>
+          <a:lnRef idx="2">
+            <a:schemeClr val="accent3">
+              <a:shade val="50000"/>
+            </a:schemeClr>
+          </a:lnRef>
+          <a:fillRef idx="1">
+            <a:schemeClr val="accent3"/>
+          </a:fillRef>
+          <a:effectRef idx="0">
+            <a:schemeClr val="accent3"/>
+          </a:effectRef>
+          <a:fontRef idx="minor">
+            <a:schemeClr val="lt1"/>
+          </a:fontRef>
+        </p:style>
+        <p:txBody>
+          <a:bodyPr rtlCol="0" anchor="ctr"/>
+          <a:lstStyle/>
+          <a:p>
+            <a:pPr algn="ctr"/>
+            <a:endParaRPr lang="de-AT" dirty="0"/>
+          </a:p>
+        </p:txBody>
+      </p:sp>
+      <p:pic>
+        <p:nvPicPr>
+          <p:cNvPr id="17" name="Grafik 16" descr="Recherche mit einfarbiger Füllung">
+            <a:extLst>
+              <a:ext uri="{FF2B5EF4-FFF2-40B4-BE49-F238E27FC236}">
+                <a16:creationId xmlns:a16="http://schemas.microsoft.com/office/drawing/2014/main" id="{D317599A-BA09-49C5-AF53-E8B5366B8220}"/>
+              </a:ext>
+            </a:extLst>
+          </p:cNvPr>
+          <p:cNvPicPr>
+            <a:picLocks noChangeAspect="1"/>
+          </p:cNvPicPr>
+          <p:nvPr/>
+        </p:nvPicPr>
+        <p:blipFill>
+          <a:blip r:embed="rId7">
+            <a:extLst>
+              <a:ext uri="{28A0092B-C50C-407E-A947-70E740481C1C}">
+                <a14:useLocalDpi xmlns:a14="http://schemas.microsoft.com/office/drawing/2010/main" val="0"/>
+              </a:ext>
+              <a:ext uri="{96DAC541-7B7A-43D3-8B79-37D633B846F1}">
+                <asvg:svgBlip xmlns:asvg="http://schemas.microsoft.com/office/drawing/2016/SVG/main" r:embed="rId8"/>
+              </a:ext>
+            </a:extLst>
+          </a:blip>
+          <a:stretch>
+            <a:fillRect/>
+          </a:stretch>
+        </p:blipFill>
+        <p:spPr>
+          <a:xfrm>
+            <a:off x="4039760" y="2599592"/>
+            <a:ext cx="914400" cy="914400"/>
+          </a:xfrm>
+          <a:prstGeom prst="rect">
+            <a:avLst/>
+          </a:prstGeom>
+        </p:spPr>
+      </p:pic>
+      <p:pic>
+        <p:nvPicPr>
+          <p:cNvPr id="21" name="Grafik 20">
+            <a:extLst>
+              <a:ext uri="{FF2B5EF4-FFF2-40B4-BE49-F238E27FC236}">
+                <a16:creationId xmlns:a16="http://schemas.microsoft.com/office/drawing/2014/main" id="{6CA7F193-187F-4FD6-BC37-D38BDB0FA8A5}"/>
+              </a:ext>
+            </a:extLst>
+          </p:cNvPr>
+          <p:cNvPicPr>
+            <a:picLocks noChangeAspect="1"/>
+          </p:cNvPicPr>
+          <p:nvPr/>
+        </p:nvPicPr>
+        <p:blipFill>
+          <a:blip r:embed="rId9"/>
+          <a:stretch>
+            <a:fillRect/>
+          </a:stretch>
+        </p:blipFill>
+        <p:spPr>
+          <a:xfrm>
+            <a:off x="3688839" y="4243134"/>
+            <a:ext cx="1810669" cy="1810669"/>
+          </a:xfrm>
+          <a:prstGeom prst="rect">
+            <a:avLst/>
+          </a:prstGeom>
+        </p:spPr>
+      </p:pic>
+      <p:sp>
+        <p:nvSpPr>
+          <p:cNvPr id="22" name="Rechteck: abgerundete Ecken 21">
+            <a:extLst>
+              <a:ext uri="{FF2B5EF4-FFF2-40B4-BE49-F238E27FC236}">
+                <a16:creationId xmlns:a16="http://schemas.microsoft.com/office/drawing/2014/main" id="{66416B73-BC94-4BD7-ADD6-280AE3176223}"/>
+              </a:ext>
+            </a:extLst>
+          </p:cNvPr>
+          <p:cNvSpPr/>
+          <p:nvPr/>
+        </p:nvSpPr>
+        <p:spPr>
+          <a:xfrm>
+            <a:off x="5658620" y="2156792"/>
+            <a:ext cx="1800000" cy="1800000"/>
+          </a:xfrm>
+          <a:prstGeom prst="roundRect">
+            <a:avLst/>
+          </a:prstGeom>
+        </p:spPr>
+        <p:style>
+          <a:lnRef idx="2">
+            <a:schemeClr val="accent3">
+              <a:shade val="50000"/>
+            </a:schemeClr>
+          </a:lnRef>
+          <a:fillRef idx="1">
+            <a:schemeClr val="accent3"/>
+          </a:fillRef>
+          <a:effectRef idx="0">
+            <a:schemeClr val="accent3"/>
+          </a:effectRef>
+          <a:fontRef idx="minor">
+            <a:schemeClr val="lt1"/>
+          </a:fontRef>
+        </p:style>
+        <p:txBody>
+          <a:bodyPr rtlCol="0" anchor="ctr"/>
+          <a:lstStyle/>
+          <a:p>
+            <a:pPr algn="ctr"/>
+            <a:endParaRPr lang="de-AT" dirty="0"/>
+          </a:p>
+        </p:txBody>
+      </p:sp>
+      <p:pic>
+        <p:nvPicPr>
+          <p:cNvPr id="25" name="Grafik 24" descr="Statistiken mit einfarbiger Füllung">
+            <a:extLst>
+              <a:ext uri="{FF2B5EF4-FFF2-40B4-BE49-F238E27FC236}">
+                <a16:creationId xmlns:a16="http://schemas.microsoft.com/office/drawing/2014/main" id="{06A05C81-3762-4D8F-86F1-64C060767FD5}"/>
+              </a:ext>
+            </a:extLst>
+          </p:cNvPr>
+          <p:cNvPicPr>
+            <a:picLocks noChangeAspect="1"/>
+          </p:cNvPicPr>
+          <p:nvPr/>
+        </p:nvPicPr>
+        <p:blipFill>
+          <a:blip r:embed="rId10">
+            <a:extLst>
+              <a:ext uri="{28A0092B-C50C-407E-A947-70E740481C1C}">
+                <a14:useLocalDpi xmlns:a14="http://schemas.microsoft.com/office/drawing/2010/main" val="0"/>
+              </a:ext>
+              <a:ext uri="{96DAC541-7B7A-43D3-8B79-37D633B846F1}">
+                <asvg:svgBlip xmlns:asvg="http://schemas.microsoft.com/office/drawing/2016/SVG/main" r:embed="rId11"/>
+              </a:ext>
+            </a:extLst>
+          </a:blip>
+          <a:stretch>
+            <a:fillRect/>
+          </a:stretch>
+        </p:blipFill>
+        <p:spPr>
+          <a:xfrm>
+            <a:off x="6101420" y="2599592"/>
+            <a:ext cx="914400" cy="914400"/>
+          </a:xfrm>
+          <a:prstGeom prst="rect">
+            <a:avLst/>
+          </a:prstGeom>
+        </p:spPr>
+      </p:pic>
+      <p:pic>
+        <p:nvPicPr>
+          <p:cNvPr id="28" name="Grafik 27">
+            <a:extLst>
+              <a:ext uri="{FF2B5EF4-FFF2-40B4-BE49-F238E27FC236}">
+                <a16:creationId xmlns:a16="http://schemas.microsoft.com/office/drawing/2014/main" id="{22D77BE1-B8C5-4C16-BD2E-C0BB2C74EE1E}"/>
+              </a:ext>
+            </a:extLst>
+          </p:cNvPr>
+          <p:cNvPicPr>
+            <a:picLocks noChangeAspect="1"/>
+          </p:cNvPicPr>
+          <p:nvPr/>
+        </p:nvPicPr>
+        <p:blipFill>
+          <a:blip r:embed="rId12"/>
+          <a:stretch>
+            <a:fillRect/>
+          </a:stretch>
+        </p:blipFill>
+        <p:spPr>
+          <a:xfrm>
+            <a:off x="5711458" y="4243133"/>
+            <a:ext cx="1816765" cy="1810669"/>
+          </a:xfrm>
+          <a:prstGeom prst="rect">
+            <a:avLst/>
+          </a:prstGeom>
+        </p:spPr>
+      </p:pic>
+    </p:spTree>
+    <p:extLst>
+      <p:ext uri="{BB962C8B-B14F-4D97-AF65-F5344CB8AC3E}">
+        <p14:creationId xmlns:p14="http://schemas.microsoft.com/office/powerpoint/2010/main" val="3359848050"/>
+      </p:ext>
+    </p:extLst>
+  </p:cSld>
+  <p:clrMapOvr>
+    <a:masterClrMapping/>
+  </p:clrMapOvr>
+</p:sld>
+</file>
+
 <file path=ppt/theme/theme1.xml><?xml version="1.0" encoding="utf-8"?>
 <a:theme xmlns:a="http://schemas.openxmlformats.org/drawingml/2006/main" name="Office">
   <a:themeElements>

</xml_diff>